<commit_message>
Update docs for ManageIssues
</commit_message>
<xml_diff>
--- a/Docs/ManageIssues.pptx
+++ b/Docs/ManageIssues.pptx
@@ -7,9 +7,10 @@
   <p:sldIdLst>
     <p:sldId id="256" r:id="rId2"/>
     <p:sldId id="257" r:id="rId3"/>
-    <p:sldId id="258" r:id="rId4"/>
-    <p:sldId id="259" r:id="rId5"/>
-    <p:sldId id="260" r:id="rId6"/>
+    <p:sldId id="261" r:id="rId4"/>
+    <p:sldId id="258" r:id="rId5"/>
+    <p:sldId id="259" r:id="rId6"/>
+    <p:sldId id="260" r:id="rId7"/>
   </p:sldIdLst>
   <p:sldSz cx="12192000" cy="6858000"/>
   <p:notesSz cx="6858000" cy="9144000"/>
@@ -263,7 +264,7 @@
           <a:p>
             <a:fld id="{684C18C5-E19F-4249-AAB1-120BBF2F051E}" type="datetimeFigureOut">
               <a:rPr lang="en-US" smtClean="0"/>
-              <a:t>3/9/2023</a:t>
+              <a:t>3/13/2023</a:t>
             </a:fld>
             <a:endParaRPr lang="en-US"/>
           </a:p>
@@ -461,7 +462,7 @@
           <a:p>
             <a:fld id="{684C18C5-E19F-4249-AAB1-120BBF2F051E}" type="datetimeFigureOut">
               <a:rPr lang="en-US" smtClean="0"/>
-              <a:t>3/9/2023</a:t>
+              <a:t>3/13/2023</a:t>
             </a:fld>
             <a:endParaRPr lang="en-US"/>
           </a:p>
@@ -669,7 +670,7 @@
           <a:p>
             <a:fld id="{684C18C5-E19F-4249-AAB1-120BBF2F051E}" type="datetimeFigureOut">
               <a:rPr lang="en-US" smtClean="0"/>
-              <a:t>3/9/2023</a:t>
+              <a:t>3/13/2023</a:t>
             </a:fld>
             <a:endParaRPr lang="en-US"/>
           </a:p>
@@ -867,7 +868,7 @@
           <a:p>
             <a:fld id="{684C18C5-E19F-4249-AAB1-120BBF2F051E}" type="datetimeFigureOut">
               <a:rPr lang="en-US" smtClean="0"/>
-              <a:t>3/9/2023</a:t>
+              <a:t>3/13/2023</a:t>
             </a:fld>
             <a:endParaRPr lang="en-US"/>
           </a:p>
@@ -1142,7 +1143,7 @@
           <a:p>
             <a:fld id="{684C18C5-E19F-4249-AAB1-120BBF2F051E}" type="datetimeFigureOut">
               <a:rPr lang="en-US" smtClean="0"/>
-              <a:t>3/9/2023</a:t>
+              <a:t>3/13/2023</a:t>
             </a:fld>
             <a:endParaRPr lang="en-US"/>
           </a:p>
@@ -1407,7 +1408,7 @@
           <a:p>
             <a:fld id="{684C18C5-E19F-4249-AAB1-120BBF2F051E}" type="datetimeFigureOut">
               <a:rPr lang="en-US" smtClean="0"/>
-              <a:t>3/9/2023</a:t>
+              <a:t>3/13/2023</a:t>
             </a:fld>
             <a:endParaRPr lang="en-US"/>
           </a:p>
@@ -1819,7 +1820,7 @@
           <a:p>
             <a:fld id="{684C18C5-E19F-4249-AAB1-120BBF2F051E}" type="datetimeFigureOut">
               <a:rPr lang="en-US" smtClean="0"/>
-              <a:t>3/9/2023</a:t>
+              <a:t>3/13/2023</a:t>
             </a:fld>
             <a:endParaRPr lang="en-US"/>
           </a:p>
@@ -1960,7 +1961,7 @@
           <a:p>
             <a:fld id="{684C18C5-E19F-4249-AAB1-120BBF2F051E}" type="datetimeFigureOut">
               <a:rPr lang="en-US" smtClean="0"/>
-              <a:t>3/9/2023</a:t>
+              <a:t>3/13/2023</a:t>
             </a:fld>
             <a:endParaRPr lang="en-US"/>
           </a:p>
@@ -2073,7 +2074,7 @@
           <a:p>
             <a:fld id="{684C18C5-E19F-4249-AAB1-120BBF2F051E}" type="datetimeFigureOut">
               <a:rPr lang="en-US" smtClean="0"/>
-              <a:t>3/9/2023</a:t>
+              <a:t>3/13/2023</a:t>
             </a:fld>
             <a:endParaRPr lang="en-US"/>
           </a:p>
@@ -2384,7 +2385,7 @@
           <a:p>
             <a:fld id="{684C18C5-E19F-4249-AAB1-120BBF2F051E}" type="datetimeFigureOut">
               <a:rPr lang="en-US" smtClean="0"/>
-              <a:t>3/9/2023</a:t>
+              <a:t>3/13/2023</a:t>
             </a:fld>
             <a:endParaRPr lang="en-US"/>
           </a:p>
@@ -2672,7 +2673,7 @@
           <a:p>
             <a:fld id="{684C18C5-E19F-4249-AAB1-120BBF2F051E}" type="datetimeFigureOut">
               <a:rPr lang="en-US" smtClean="0"/>
-              <a:t>3/9/2023</a:t>
+              <a:t>3/13/2023</a:t>
             </a:fld>
             <a:endParaRPr lang="en-US"/>
           </a:p>
@@ -2913,7 +2914,7 @@
           <a:p>
             <a:fld id="{684C18C5-E19F-4249-AAB1-120BBF2F051E}" type="datetimeFigureOut">
               <a:rPr lang="en-US" smtClean="0"/>
-              <a:t>3/9/2023</a:t>
+              <a:t>3/13/2023</a:t>
             </a:fld>
             <a:endParaRPr lang="en-US"/>
           </a:p>
@@ -3473,7 +3474,7 @@
         </p:spPr>
         <p:txBody>
           <a:bodyPr>
-            <a:normAutofit lnSpcReduction="10000"/>
+            <a:normAutofit/>
           </a:bodyPr>
           <a:lstStyle/>
           <a:p>
@@ -3562,88 +3563,6 @@
               <a:t>PSGallery</a:t>
             </a:r>
             <a:endParaRPr lang="en-US" dirty="0"/>
-          </a:p>
-          <a:p>
-            <a:r>
-              <a:rPr lang="en-US" dirty="0"/>
-              <a:t>Import the module (once per session)</a:t>
-            </a:r>
-          </a:p>
-          <a:p>
-            <a:pPr lvl="1"/>
-            <a:r>
-              <a:rPr lang="en-US" dirty="0"/>
-              <a:t>Run the following PowerShell command:</a:t>
-            </a:r>
-          </a:p>
-          <a:p>
-            <a:pPr marL="914400" lvl="2" indent="0">
-              <a:buNone/>
-            </a:pPr>
-            <a:r>
-              <a:rPr lang="en-US" sz="1400" dirty="0">
-                <a:latin typeface="Consolas" panose="020B0609020204030204" pitchFamily="49" charset="0"/>
-              </a:rPr>
-              <a:t>Import-Module </a:t>
-            </a:r>
-            <a:r>
-              <a:rPr lang="en-US" sz="1400" dirty="0" err="1">
-                <a:latin typeface="Consolas" panose="020B0609020204030204" pitchFamily="49" charset="0"/>
-              </a:rPr>
-              <a:t>ManageIssues</a:t>
-            </a:r>
-            <a:endParaRPr lang="en-US" sz="1400" dirty="0">
-              <a:latin typeface="Consolas" panose="020B0609020204030204" pitchFamily="49" charset="0"/>
-            </a:endParaRPr>
-          </a:p>
-        </p:txBody>
-      </p:sp>
-      <p:sp>
-        <p:nvSpPr>
-          <p:cNvPr id="4" name="TextBox 3">
-            <a:extLst>
-              <a:ext uri="{FF2B5EF4-FFF2-40B4-BE49-F238E27FC236}">
-                <a16:creationId xmlns:a16="http://schemas.microsoft.com/office/drawing/2014/main" id="{00A8D0F2-C3B6-2576-DE24-ED347D5A2AD0}"/>
-              </a:ext>
-            </a:extLst>
-          </p:cNvPr>
-          <p:cNvSpPr txBox="1"/>
-          <p:nvPr/>
-        </p:nvSpPr>
-        <p:spPr>
-          <a:xfrm>
-            <a:off x="8488218" y="1908312"/>
-            <a:ext cx="2946399" cy="1754326"/>
-          </a:xfrm>
-          <a:prstGeom prst="rect">
-            <a:avLst/>
-          </a:prstGeom>
-          <a:noFill/>
-          <a:ln>
-            <a:solidFill>
-              <a:schemeClr val="accent1"/>
-            </a:solidFill>
-          </a:ln>
-        </p:spPr>
-        <p:txBody>
-          <a:bodyPr wrap="square" rtlCol="0">
-            <a:spAutoFit/>
-          </a:bodyPr>
-          <a:lstStyle/>
-          <a:p>
-            <a:r>
-              <a:rPr lang="en-US" dirty="0"/>
-              <a:t>IMPORTANT</a:t>
-            </a:r>
-          </a:p>
-          <a:p>
-            <a:endParaRPr lang="en-US" dirty="0"/>
-          </a:p>
-          <a:p>
-            <a:r>
-              <a:rPr lang="en-US" dirty="0"/>
-              <a:t>You must also have your GitHub personal access token stored in the GITHUB_TOKEN environment variable.</a:t>
-            </a:r>
           </a:p>
         </p:txBody>
       </p:sp>
@@ -3682,7 +3601,7 @@
           <p:cNvPr id="2" name="Title 1">
             <a:extLst>
               <a:ext uri="{FF2B5EF4-FFF2-40B4-BE49-F238E27FC236}">
-                <a16:creationId xmlns:a16="http://schemas.microsoft.com/office/drawing/2014/main" id="{78C8DC7E-22ED-3F5F-B749-54D8DE5D196E}"/>
+                <a16:creationId xmlns:a16="http://schemas.microsoft.com/office/drawing/2014/main" id="{8976578A-9075-D69F-913A-795B805FBE3D}"/>
               </a:ext>
             </a:extLst>
           </p:cNvPr>
@@ -3700,146 +3619,148 @@
           <a:p>
             <a:r>
               <a:rPr lang="en-US" dirty="0"/>
-              <a:t>Managing issues</a:t>
-            </a:r>
-          </a:p>
-        </p:txBody>
-      </p:sp>
-      <p:sp>
-        <p:nvSpPr>
-          <p:cNvPr id="3" name="Content Placeholder 2">
-            <a:extLst>
-              <a:ext uri="{FF2B5EF4-FFF2-40B4-BE49-F238E27FC236}">
-                <a16:creationId xmlns:a16="http://schemas.microsoft.com/office/drawing/2014/main" id="{07A9FD97-C673-120F-E24F-4CFD16C17912}"/>
-              </a:ext>
-            </a:extLst>
-          </p:cNvPr>
-          <p:cNvSpPr>
-            <a:spLocks noGrp="1"/>
-          </p:cNvSpPr>
+              <a:t>Configure your GitHub personal token</a:t>
+            </a:r>
+          </a:p>
+        </p:txBody>
+      </p:sp>
+      <p:pic>
+        <p:nvPicPr>
+          <p:cNvPr id="5" name="Content Placeholder 4">
+            <a:extLst>
+              <a:ext uri="{FF2B5EF4-FFF2-40B4-BE49-F238E27FC236}">
+                <a16:creationId xmlns:a16="http://schemas.microsoft.com/office/drawing/2014/main" id="{ED843A4C-36EF-CD5C-E468-753561035036}"/>
+              </a:ext>
+            </a:extLst>
+          </p:cNvPr>
+          <p:cNvPicPr>
+            <a:picLocks noGrp="1" noChangeAspect="1"/>
+          </p:cNvPicPr>
           <p:nvPr>
             <p:ph idx="1"/>
           </p:nvPr>
-        </p:nvSpPr>
-        <p:spPr/>
-        <p:txBody>
-          <a:bodyPr/>
-          <a:lstStyle/>
-          <a:p>
-            <a:pPr marL="514350" indent="-514350">
-              <a:buFont typeface="+mj-lt"/>
-              <a:buAutoNum type="arabicPeriod"/>
+        </p:nvPicPr>
+        <p:blipFill>
+          <a:blip r:embed="rId2"/>
+          <a:stretch>
+            <a:fillRect/>
+          </a:stretch>
+        </p:blipFill>
+        <p:spPr>
+          <a:xfrm>
+            <a:off x="6757002" y="2141537"/>
+            <a:ext cx="4596798" cy="4351338"/>
+          </a:xfrm>
+        </p:spPr>
+      </p:pic>
+      <p:sp>
+        <p:nvSpPr>
+          <p:cNvPr id="7" name="TextBox 6">
+            <a:extLst>
+              <a:ext uri="{FF2B5EF4-FFF2-40B4-BE49-F238E27FC236}">
+                <a16:creationId xmlns:a16="http://schemas.microsoft.com/office/drawing/2014/main" id="{B6B0B1D5-9E05-E004-257F-EE436DA6CAC5}"/>
+              </a:ext>
+            </a:extLst>
+          </p:cNvPr>
+          <p:cNvSpPr txBox="1"/>
+          <p:nvPr/>
+        </p:nvSpPr>
+        <p:spPr>
+          <a:xfrm>
+            <a:off x="838200" y="2141537"/>
+            <a:ext cx="5257800" cy="4185761"/>
+          </a:xfrm>
+          <a:prstGeom prst="rect">
+            <a:avLst/>
+          </a:prstGeom>
+          <a:noFill/>
+        </p:spPr>
+        <p:txBody>
+          <a:bodyPr wrap="square">
+            <a:spAutoFit/>
+          </a:bodyPr>
+          <a:lstStyle/>
+          <a:p>
+            <a:r>
+              <a:rPr lang="en-US" dirty="0"/>
+              <a:t>You must store your GitHub personal access token in the GITHUB_TOKEN environment variable.</a:t>
+            </a:r>
+          </a:p>
+          <a:p>
+            <a:pPr marL="285750" indent="-285750">
+              <a:buFont typeface="Arial" panose="020B0604020202020204" pitchFamily="34" charset="0"/>
+              <a:buChar char="•"/>
             </a:pPr>
             <a:r>
               <a:rPr lang="en-US" dirty="0"/>
-              <a:t>Use </a:t>
-            </a:r>
-            <a:r>
-              <a:rPr lang="en-US" dirty="0">
-                <a:solidFill>
-                  <a:schemeClr val="accent1">
-                    <a:lumMod val="75000"/>
-                  </a:schemeClr>
-                </a:solidFill>
+              <a:t>On Windows 10, you can set this in the System Control Panel.</a:t>
+            </a:r>
+          </a:p>
+          <a:p>
+            <a:pPr marL="285750" indent="-285750">
+              <a:buFont typeface="Arial" panose="020B0604020202020204" pitchFamily="34" charset="0"/>
+              <a:buChar char="•"/>
+            </a:pPr>
+            <a:r>
+              <a:rPr lang="en-US" dirty="0"/>
+              <a:t>On Windows 11, search Settings for “Environment variable”</a:t>
+            </a:r>
+          </a:p>
+          <a:p>
+            <a:endParaRPr lang="en-US" dirty="0"/>
+          </a:p>
+          <a:p>
+            <a:r>
+              <a:rPr lang="en-US" dirty="0"/>
+              <a:t>To get the new environment variable, you must start a new PowerShell session. If you are using Windows Terminal, you must restart it.</a:t>
+            </a:r>
+          </a:p>
+          <a:p>
+            <a:endParaRPr lang="en-US" dirty="0"/>
+          </a:p>
+          <a:p>
+            <a:r>
+              <a:rPr lang="en-US" dirty="0"/>
+              <a:t>Import the module (once per session)</a:t>
+            </a:r>
+          </a:p>
+          <a:p>
+            <a:pPr marL="285750" indent="-285750">
+              <a:buFont typeface="Arial" panose="020B0604020202020204" pitchFamily="34" charset="0"/>
+              <a:buChar char="•"/>
+            </a:pPr>
+            <a:r>
+              <a:rPr lang="en-US" dirty="0"/>
+              <a:t>Run the following PowerShell command:</a:t>
+            </a:r>
+          </a:p>
+          <a:p>
+            <a:pPr lvl="1"/>
+            <a:r>
+              <a:rPr lang="en-US" sz="1400" dirty="0">
                 <a:latin typeface="Consolas" panose="020B0609020204030204" pitchFamily="49" charset="0"/>
               </a:rPr>
-              <a:t>Find-Issue</a:t>
-            </a:r>
-            <a:r>
-              <a:rPr lang="en-US" dirty="0"/>
-              <a:t> to create a CSV list of issues to be triaged</a:t>
-            </a:r>
-          </a:p>
-          <a:p>
-            <a:pPr marL="514350" indent="-514350">
-              <a:buFont typeface="+mj-lt"/>
-              <a:buAutoNum type="arabicPeriod"/>
-            </a:pPr>
-            <a:r>
-              <a:rPr lang="en-US" dirty="0"/>
-              <a:t>Triage the issues</a:t>
-            </a:r>
-          </a:p>
-          <a:p>
-            <a:pPr lvl="1"/>
-            <a:r>
-              <a:rPr lang="en-US" dirty="0"/>
-              <a:t>Open the CSV in Excel</a:t>
-            </a:r>
-          </a:p>
-          <a:p>
-            <a:pPr lvl="1"/>
-            <a:r>
-              <a:rPr lang="en-US" dirty="0"/>
-              <a:t>Create new worksheets for issues that require different responses</a:t>
-            </a:r>
-          </a:p>
-          <a:p>
-            <a:pPr lvl="2"/>
-            <a:r>
-              <a:rPr lang="en-US" dirty="0"/>
-              <a:t>E.g. For review with PM, close with response #1, close with response #2, etc.</a:t>
-            </a:r>
-          </a:p>
-          <a:p>
-            <a:pPr lvl="1"/>
-            <a:r>
-              <a:rPr lang="en-US" dirty="0"/>
-              <a:t>Move rows from the main worksheet to the appropriate new worksheet</a:t>
-            </a:r>
-          </a:p>
-          <a:p>
-            <a:pPr marL="514350" indent="-514350">
-              <a:buFont typeface="+mj-lt"/>
-              <a:buAutoNum type="arabicPeriod"/>
-            </a:pPr>
-            <a:r>
-              <a:rPr lang="en-US" dirty="0"/>
-              <a:t>Save each worksheet to a new CSV file</a:t>
-            </a:r>
-          </a:p>
-          <a:p>
-            <a:pPr marL="514350" indent="-514350">
-              <a:buFont typeface="+mj-lt"/>
-              <a:buAutoNum type="arabicPeriod"/>
-            </a:pPr>
-            <a:r>
-              <a:rPr lang="en-US" dirty="0"/>
-              <a:t>Use </a:t>
-            </a:r>
-            <a:r>
-              <a:rPr lang="en-US" dirty="0">
-                <a:solidFill>
-                  <a:schemeClr val="accent1">
-                    <a:lumMod val="75000"/>
-                  </a:schemeClr>
-                </a:solidFill>
+              <a:t>Import-Module </a:t>
+            </a:r>
+            <a:r>
+              <a:rPr lang="en-US" sz="1400" dirty="0" err="1">
                 <a:latin typeface="Consolas" panose="020B0609020204030204" pitchFamily="49" charset="0"/>
               </a:rPr>
-              <a:t>Add-</a:t>
-            </a:r>
-            <a:r>
-              <a:rPr lang="en-US" dirty="0" err="1">
-                <a:solidFill>
-                  <a:schemeClr val="accent1">
-                    <a:lumMod val="75000"/>
-                  </a:schemeClr>
-                </a:solidFill>
-                <a:latin typeface="Consolas" panose="020B0609020204030204" pitchFamily="49" charset="0"/>
-              </a:rPr>
-              <a:t>ClosingComment</a:t>
-            </a:r>
-            <a:r>
-              <a:rPr lang="en-US" dirty="0"/>
-              <a:t> to add comments for issues in each CSV list of issues to be triaged</a:t>
-            </a:r>
+              <a:t>ManageIssues</a:t>
+            </a:r>
+            <a:endParaRPr lang="en-US" sz="1400" dirty="0">
+              <a:latin typeface="Consolas" panose="020B0609020204030204" pitchFamily="49" charset="0"/>
+            </a:endParaRPr>
+          </a:p>
+          <a:p>
+            <a:endParaRPr lang="en-US" dirty="0"/>
           </a:p>
         </p:txBody>
       </p:sp>
     </p:spTree>
     <p:extLst>
       <p:ext uri="{BB962C8B-B14F-4D97-AF65-F5344CB8AC3E}">
-        <p14:creationId xmlns:p14="http://schemas.microsoft.com/office/powerpoint/2010/main" val="2009987971"/>
+        <p14:creationId xmlns:p14="http://schemas.microsoft.com/office/powerpoint/2010/main" val="1855200700"/>
       </p:ext>
     </p:extLst>
   </p:cSld>
@@ -3871,6 +3792,195 @@
           <p:cNvPr id="2" name="Title 1">
             <a:extLst>
               <a:ext uri="{FF2B5EF4-FFF2-40B4-BE49-F238E27FC236}">
+                <a16:creationId xmlns:a16="http://schemas.microsoft.com/office/drawing/2014/main" id="{78C8DC7E-22ED-3F5F-B749-54D8DE5D196E}"/>
+              </a:ext>
+            </a:extLst>
+          </p:cNvPr>
+          <p:cNvSpPr>
+            <a:spLocks noGrp="1"/>
+          </p:cNvSpPr>
+          <p:nvPr>
+            <p:ph type="title"/>
+          </p:nvPr>
+        </p:nvSpPr>
+        <p:spPr/>
+        <p:txBody>
+          <a:bodyPr/>
+          <a:lstStyle/>
+          <a:p>
+            <a:r>
+              <a:rPr lang="en-US" dirty="0"/>
+              <a:t>Managing issues</a:t>
+            </a:r>
+          </a:p>
+        </p:txBody>
+      </p:sp>
+      <p:sp>
+        <p:nvSpPr>
+          <p:cNvPr id="3" name="Content Placeholder 2">
+            <a:extLst>
+              <a:ext uri="{FF2B5EF4-FFF2-40B4-BE49-F238E27FC236}">
+                <a16:creationId xmlns:a16="http://schemas.microsoft.com/office/drawing/2014/main" id="{07A9FD97-C673-120F-E24F-4CFD16C17912}"/>
+              </a:ext>
+            </a:extLst>
+          </p:cNvPr>
+          <p:cNvSpPr>
+            <a:spLocks noGrp="1"/>
+          </p:cNvSpPr>
+          <p:nvPr>
+            <p:ph idx="1"/>
+          </p:nvPr>
+        </p:nvSpPr>
+        <p:spPr/>
+        <p:txBody>
+          <a:bodyPr/>
+          <a:lstStyle/>
+          <a:p>
+            <a:pPr marL="514350" indent="-514350">
+              <a:buFont typeface="+mj-lt"/>
+              <a:buAutoNum type="arabicPeriod"/>
+            </a:pPr>
+            <a:r>
+              <a:rPr lang="en-US" dirty="0"/>
+              <a:t>Use </a:t>
+            </a:r>
+            <a:r>
+              <a:rPr lang="en-US" dirty="0">
+                <a:solidFill>
+                  <a:schemeClr val="accent1">
+                    <a:lumMod val="75000"/>
+                  </a:schemeClr>
+                </a:solidFill>
+                <a:latin typeface="Consolas" panose="020B0609020204030204" pitchFamily="49" charset="0"/>
+              </a:rPr>
+              <a:t>Find-Issue</a:t>
+            </a:r>
+            <a:r>
+              <a:rPr lang="en-US" dirty="0"/>
+              <a:t> to create a CSV list of issues to be triaged</a:t>
+            </a:r>
+          </a:p>
+          <a:p>
+            <a:pPr marL="514350" indent="-514350">
+              <a:buFont typeface="+mj-lt"/>
+              <a:buAutoNum type="arabicPeriod"/>
+            </a:pPr>
+            <a:r>
+              <a:rPr lang="en-US" dirty="0"/>
+              <a:t>Triage the issues</a:t>
+            </a:r>
+          </a:p>
+          <a:p>
+            <a:pPr lvl="1"/>
+            <a:r>
+              <a:rPr lang="en-US" dirty="0"/>
+              <a:t>Open the CSV in Excel</a:t>
+            </a:r>
+          </a:p>
+          <a:p>
+            <a:pPr lvl="1"/>
+            <a:r>
+              <a:rPr lang="en-US" dirty="0"/>
+              <a:t>Create new worksheets for issues that require different responses</a:t>
+            </a:r>
+          </a:p>
+          <a:p>
+            <a:pPr lvl="2"/>
+            <a:r>
+              <a:rPr lang="en-US" dirty="0"/>
+              <a:t>E.g. For review with PM, close with response #1, close with response #2, etc.</a:t>
+            </a:r>
+          </a:p>
+          <a:p>
+            <a:pPr lvl="1"/>
+            <a:r>
+              <a:rPr lang="en-US" dirty="0"/>
+              <a:t>Move rows from the main worksheet to the appropriate new worksheet</a:t>
+            </a:r>
+          </a:p>
+          <a:p>
+            <a:pPr marL="514350" indent="-514350">
+              <a:buFont typeface="+mj-lt"/>
+              <a:buAutoNum type="arabicPeriod"/>
+            </a:pPr>
+            <a:r>
+              <a:rPr lang="en-US" dirty="0"/>
+              <a:t>Save each worksheet to a new CSV file</a:t>
+            </a:r>
+          </a:p>
+          <a:p>
+            <a:pPr marL="514350" indent="-514350">
+              <a:buFont typeface="+mj-lt"/>
+              <a:buAutoNum type="arabicPeriod"/>
+            </a:pPr>
+            <a:r>
+              <a:rPr lang="en-US" dirty="0"/>
+              <a:t>Use </a:t>
+            </a:r>
+            <a:r>
+              <a:rPr lang="en-US" dirty="0">
+                <a:solidFill>
+                  <a:schemeClr val="accent1">
+                    <a:lumMod val="75000"/>
+                  </a:schemeClr>
+                </a:solidFill>
+                <a:latin typeface="Consolas" panose="020B0609020204030204" pitchFamily="49" charset="0"/>
+              </a:rPr>
+              <a:t>Add-</a:t>
+            </a:r>
+            <a:r>
+              <a:rPr lang="en-US" dirty="0" err="1">
+                <a:solidFill>
+                  <a:schemeClr val="accent1">
+                    <a:lumMod val="75000"/>
+                  </a:schemeClr>
+                </a:solidFill>
+                <a:latin typeface="Consolas" panose="020B0609020204030204" pitchFamily="49" charset="0"/>
+              </a:rPr>
+              <a:t>ClosingComment</a:t>
+            </a:r>
+            <a:r>
+              <a:rPr lang="en-US" dirty="0"/>
+              <a:t> to add comments for issues in each CSV list of issues to be triaged</a:t>
+            </a:r>
+          </a:p>
+        </p:txBody>
+      </p:sp>
+    </p:spTree>
+    <p:extLst>
+      <p:ext uri="{BB962C8B-B14F-4D97-AF65-F5344CB8AC3E}">
+        <p14:creationId xmlns:p14="http://schemas.microsoft.com/office/powerpoint/2010/main" val="2009987971"/>
+      </p:ext>
+    </p:extLst>
+  </p:cSld>
+  <p:clrMapOvr>
+    <a:masterClrMapping/>
+  </p:clrMapOvr>
+</p:sld>
+</file>
+
+<file path=ppt/slides/slide5.xml><?xml version="1.0" encoding="utf-8"?>
+<p:sld xmlns:a="http://schemas.openxmlformats.org/drawingml/2006/main" xmlns:r="http://schemas.openxmlformats.org/officeDocument/2006/relationships" xmlns:p="http://schemas.openxmlformats.org/presentationml/2006/main">
+  <p:cSld>
+    <p:spTree>
+      <p:nvGrpSpPr>
+        <p:cNvPr id="1" name=""/>
+        <p:cNvGrpSpPr/>
+        <p:nvPr/>
+      </p:nvGrpSpPr>
+      <p:grpSpPr>
+        <a:xfrm>
+          <a:off x="0" y="0"/>
+          <a:ext cx="0" cy="0"/>
+          <a:chOff x="0" y="0"/>
+          <a:chExt cx="0" cy="0"/>
+        </a:xfrm>
+      </p:grpSpPr>
+      <p:sp>
+        <p:nvSpPr>
+          <p:cNvPr id="2" name="Title 1">
+            <a:extLst>
+              <a:ext uri="{FF2B5EF4-FFF2-40B4-BE49-F238E27FC236}">
                 <a16:creationId xmlns:a16="http://schemas.microsoft.com/office/drawing/2014/main" id="{2BC7FBCD-0A41-4C1A-CC6B-850383486414}"/>
               </a:ext>
             </a:extLst>
@@ -4050,7 +4160,7 @@
 </p:sld>
 </file>
 
-<file path=ppt/slides/slide5.xml><?xml version="1.0" encoding="utf-8"?>
+<file path=ppt/slides/slide6.xml><?xml version="1.0" encoding="utf-8"?>
 <p:sld xmlns:a="http://schemas.openxmlformats.org/drawingml/2006/main" xmlns:r="http://schemas.openxmlformats.org/officeDocument/2006/relationships" xmlns:p="http://schemas.openxmlformats.org/presentationml/2006/main">
   <p:cSld>
     <p:spTree>

</xml_diff>

<commit_message>
Fix formatter for PSStyle
</commit_message>
<xml_diff>
--- a/Docs/ManageIssues.pptx
+++ b/Docs/ManageIssues.pptx
@@ -264,7 +264,7 @@
           <a:p>
             <a:fld id="{684C18C5-E19F-4249-AAB1-120BBF2F051E}" type="datetimeFigureOut">
               <a:rPr lang="en-US" smtClean="0"/>
-              <a:t>3/14/2023</a:t>
+              <a:t>2/20/2024</a:t>
             </a:fld>
             <a:endParaRPr lang="en-US"/>
           </a:p>
@@ -462,7 +462,7 @@
           <a:p>
             <a:fld id="{684C18C5-E19F-4249-AAB1-120BBF2F051E}" type="datetimeFigureOut">
               <a:rPr lang="en-US" smtClean="0"/>
-              <a:t>3/14/2023</a:t>
+              <a:t>2/20/2024</a:t>
             </a:fld>
             <a:endParaRPr lang="en-US"/>
           </a:p>
@@ -670,7 +670,7 @@
           <a:p>
             <a:fld id="{684C18C5-E19F-4249-AAB1-120BBF2F051E}" type="datetimeFigureOut">
               <a:rPr lang="en-US" smtClean="0"/>
-              <a:t>3/14/2023</a:t>
+              <a:t>2/20/2024</a:t>
             </a:fld>
             <a:endParaRPr lang="en-US"/>
           </a:p>
@@ -868,7 +868,7 @@
           <a:p>
             <a:fld id="{684C18C5-E19F-4249-AAB1-120BBF2F051E}" type="datetimeFigureOut">
               <a:rPr lang="en-US" smtClean="0"/>
-              <a:t>3/14/2023</a:t>
+              <a:t>2/20/2024</a:t>
             </a:fld>
             <a:endParaRPr lang="en-US"/>
           </a:p>
@@ -1143,7 +1143,7 @@
           <a:p>
             <a:fld id="{684C18C5-E19F-4249-AAB1-120BBF2F051E}" type="datetimeFigureOut">
               <a:rPr lang="en-US" smtClean="0"/>
-              <a:t>3/14/2023</a:t>
+              <a:t>2/20/2024</a:t>
             </a:fld>
             <a:endParaRPr lang="en-US"/>
           </a:p>
@@ -1408,7 +1408,7 @@
           <a:p>
             <a:fld id="{684C18C5-E19F-4249-AAB1-120BBF2F051E}" type="datetimeFigureOut">
               <a:rPr lang="en-US" smtClean="0"/>
-              <a:t>3/14/2023</a:t>
+              <a:t>2/20/2024</a:t>
             </a:fld>
             <a:endParaRPr lang="en-US"/>
           </a:p>
@@ -1820,7 +1820,7 @@
           <a:p>
             <a:fld id="{684C18C5-E19F-4249-AAB1-120BBF2F051E}" type="datetimeFigureOut">
               <a:rPr lang="en-US" smtClean="0"/>
-              <a:t>3/14/2023</a:t>
+              <a:t>2/20/2024</a:t>
             </a:fld>
             <a:endParaRPr lang="en-US"/>
           </a:p>
@@ -1961,7 +1961,7 @@
           <a:p>
             <a:fld id="{684C18C5-E19F-4249-AAB1-120BBF2F051E}" type="datetimeFigureOut">
               <a:rPr lang="en-US" smtClean="0"/>
-              <a:t>3/14/2023</a:t>
+              <a:t>2/20/2024</a:t>
             </a:fld>
             <a:endParaRPr lang="en-US"/>
           </a:p>
@@ -2074,7 +2074,7 @@
           <a:p>
             <a:fld id="{684C18C5-E19F-4249-AAB1-120BBF2F051E}" type="datetimeFigureOut">
               <a:rPr lang="en-US" smtClean="0"/>
-              <a:t>3/14/2023</a:t>
+              <a:t>2/20/2024</a:t>
             </a:fld>
             <a:endParaRPr lang="en-US"/>
           </a:p>
@@ -2385,7 +2385,7 @@
           <a:p>
             <a:fld id="{684C18C5-E19F-4249-AAB1-120BBF2F051E}" type="datetimeFigureOut">
               <a:rPr lang="en-US" smtClean="0"/>
-              <a:t>3/14/2023</a:t>
+              <a:t>2/20/2024</a:t>
             </a:fld>
             <a:endParaRPr lang="en-US"/>
           </a:p>
@@ -2673,7 +2673,7 @@
           <a:p>
             <a:fld id="{684C18C5-E19F-4249-AAB1-120BBF2F051E}" type="datetimeFigureOut">
               <a:rPr lang="en-US" smtClean="0"/>
-              <a:t>3/14/2023</a:t>
+              <a:t>2/20/2024</a:t>
             </a:fld>
             <a:endParaRPr lang="en-US"/>
           </a:p>
@@ -2914,7 +2914,7 @@
           <a:p>
             <a:fld id="{684C18C5-E19F-4249-AAB1-120BBF2F051E}" type="datetimeFigureOut">
               <a:rPr lang="en-US" smtClean="0"/>
-              <a:t>3/14/2023</a:t>
+              <a:t>2/20/2024</a:t>
             </a:fld>
             <a:endParaRPr lang="en-US"/>
           </a:p>
@@ -3487,8 +3487,13 @@
           <a:p>
             <a:r>
               <a:rPr lang="en-US" dirty="0"/>
-              <a:t>Requires PowerShell 7.0 or higher – current version is 7.3.3</a:t>
-            </a:r>
+              <a:t>Requires PowerShell 7.0 or higher – current version </a:t>
+            </a:r>
+            <a:r>
+              <a:rPr lang="en-US"/>
+              <a:t>is 7.4.1</a:t>
+            </a:r>
+            <a:endParaRPr lang="en-US" dirty="0"/>
           </a:p>
           <a:p>
             <a:pPr lvl="1"/>

</xml_diff>